<commit_message>
inclusion of the human immune system development map on the projects tab
</commit_message>
<xml_diff>
--- a/images/projects/buttons07.pptx
+++ b/images/projects/buttons07.pptx
@@ -259,7 +259,7 @@
           <a:p>
             <a:fld id="{40FD3D9A-36CF-C845-9F31-DDC271F1AF6B}" type="datetimeFigureOut">
               <a:rPr lang="en-GB" smtClean="0"/>
-              <a:t>19/11/2023</a:t>
+              <a:t>10/07/2024</a:t>
             </a:fld>
             <a:endParaRPr lang="en-GB"/>
           </a:p>
@@ -457,7 +457,7 @@
           <a:p>
             <a:fld id="{40FD3D9A-36CF-C845-9F31-DDC271F1AF6B}" type="datetimeFigureOut">
               <a:rPr lang="en-GB" smtClean="0"/>
-              <a:t>19/11/2023</a:t>
+              <a:t>10/07/2024</a:t>
             </a:fld>
             <a:endParaRPr lang="en-GB"/>
           </a:p>
@@ -665,7 +665,7 @@
           <a:p>
             <a:fld id="{40FD3D9A-36CF-C845-9F31-DDC271F1AF6B}" type="datetimeFigureOut">
               <a:rPr lang="en-GB" smtClean="0"/>
-              <a:t>19/11/2023</a:t>
+              <a:t>10/07/2024</a:t>
             </a:fld>
             <a:endParaRPr lang="en-GB"/>
           </a:p>
@@ -863,7 +863,7 @@
           <a:p>
             <a:fld id="{40FD3D9A-36CF-C845-9F31-DDC271F1AF6B}" type="datetimeFigureOut">
               <a:rPr lang="en-GB" smtClean="0"/>
-              <a:t>19/11/2023</a:t>
+              <a:t>10/07/2024</a:t>
             </a:fld>
             <a:endParaRPr lang="en-GB"/>
           </a:p>
@@ -1138,7 +1138,7 @@
           <a:p>
             <a:fld id="{40FD3D9A-36CF-C845-9F31-DDC271F1AF6B}" type="datetimeFigureOut">
               <a:rPr lang="en-GB" smtClean="0"/>
-              <a:t>19/11/2023</a:t>
+              <a:t>10/07/2024</a:t>
             </a:fld>
             <a:endParaRPr lang="en-GB"/>
           </a:p>
@@ -1403,7 +1403,7 @@
           <a:p>
             <a:fld id="{40FD3D9A-36CF-C845-9F31-DDC271F1AF6B}" type="datetimeFigureOut">
               <a:rPr lang="en-GB" smtClean="0"/>
-              <a:t>19/11/2023</a:t>
+              <a:t>10/07/2024</a:t>
             </a:fld>
             <a:endParaRPr lang="en-GB"/>
           </a:p>
@@ -1815,7 +1815,7 @@
           <a:p>
             <a:fld id="{40FD3D9A-36CF-C845-9F31-DDC271F1AF6B}" type="datetimeFigureOut">
               <a:rPr lang="en-GB" smtClean="0"/>
-              <a:t>19/11/2023</a:t>
+              <a:t>10/07/2024</a:t>
             </a:fld>
             <a:endParaRPr lang="en-GB"/>
           </a:p>
@@ -1956,7 +1956,7 @@
           <a:p>
             <a:fld id="{40FD3D9A-36CF-C845-9F31-DDC271F1AF6B}" type="datetimeFigureOut">
               <a:rPr lang="en-GB" smtClean="0"/>
-              <a:t>19/11/2023</a:t>
+              <a:t>10/07/2024</a:t>
             </a:fld>
             <a:endParaRPr lang="en-GB"/>
           </a:p>
@@ -2069,7 +2069,7 @@
           <a:p>
             <a:fld id="{40FD3D9A-36CF-C845-9F31-DDC271F1AF6B}" type="datetimeFigureOut">
               <a:rPr lang="en-GB" smtClean="0"/>
-              <a:t>19/11/2023</a:t>
+              <a:t>10/07/2024</a:t>
             </a:fld>
             <a:endParaRPr lang="en-GB"/>
           </a:p>
@@ -2380,7 +2380,7 @@
           <a:p>
             <a:fld id="{40FD3D9A-36CF-C845-9F31-DDC271F1AF6B}" type="datetimeFigureOut">
               <a:rPr lang="en-GB" smtClean="0"/>
-              <a:t>19/11/2023</a:t>
+              <a:t>10/07/2024</a:t>
             </a:fld>
             <a:endParaRPr lang="en-GB"/>
           </a:p>
@@ -2668,7 +2668,7 @@
           <a:p>
             <a:fld id="{40FD3D9A-36CF-C845-9F31-DDC271F1AF6B}" type="datetimeFigureOut">
               <a:rPr lang="en-GB" smtClean="0"/>
-              <a:t>19/11/2023</a:t>
+              <a:t>10/07/2024</a:t>
             </a:fld>
             <a:endParaRPr lang="en-GB"/>
           </a:p>
@@ -2909,7 +2909,7 @@
           <a:p>
             <a:fld id="{40FD3D9A-36CF-C845-9F31-DDC271F1AF6B}" type="datetimeFigureOut">
               <a:rPr lang="en-GB" smtClean="0"/>
-              <a:t>19/11/2023</a:t>
+              <a:t>10/07/2024</a:t>
             </a:fld>
             <a:endParaRPr lang="en-GB"/>
           </a:p>
@@ -4283,7 +4283,6 @@
                   <a:srgbClr val="2E5287"/>
                 </a:solidFill>
                 <a:latin typeface="Noto Sans InsParthi" panose="020F0502020204030204" pitchFamily="34" charset="0"/>
-                <a:cs typeface="Noto Sans InsParthi" panose="020F0502020204030204" pitchFamily="34" charset="0"/>
               </a:rPr>
               <a:t>Atopic dermatitis</a:t>
             </a:r>
@@ -5080,6 +5079,92 @@
                 <a:cs typeface="Noto Sans InsParthi" panose="020F0502020204030204" pitchFamily="34" charset="0"/>
               </a:rPr>
               <a:t>Cytokine release syndrome ★☆☆☆☆</a:t>
+            </a:r>
+          </a:p>
+        </p:txBody>
+      </p:sp>
+      <p:sp>
+        <p:nvSpPr>
+          <p:cNvPr id="4" name="Rounded Rectangle 35">
+            <a:extLst>
+              <a:ext uri="{FF2B5EF4-FFF2-40B4-BE49-F238E27FC236}">
+                <a16:creationId xmlns:a16="http://schemas.microsoft.com/office/drawing/2014/main" id="{B6921709-470A-1626-AD4B-5E0ED8B4AF47}"/>
+              </a:ext>
+            </a:extLst>
+          </p:cNvPr>
+          <p:cNvSpPr/>
+          <p:nvPr/>
+        </p:nvSpPr>
+        <p:spPr>
+          <a:xfrm>
+            <a:off x="4433018" y="4657897"/>
+            <a:ext cx="1740988" cy="581006"/>
+          </a:xfrm>
+          <a:prstGeom prst="roundRect">
+            <a:avLst>
+              <a:gd name="adj" fmla="val 10628"/>
+            </a:avLst>
+          </a:prstGeom>
+          <a:solidFill>
+            <a:schemeClr val="bg1"/>
+          </a:solidFill>
+          <a:ln w="12700">
+            <a:solidFill>
+              <a:srgbClr val="2E5287"/>
+            </a:solidFill>
+          </a:ln>
+        </p:spPr>
+        <p:style>
+          <a:lnRef idx="2">
+            <a:schemeClr val="accent1">
+              <a:shade val="15000"/>
+            </a:schemeClr>
+          </a:lnRef>
+          <a:fillRef idx="1">
+            <a:schemeClr val="accent1"/>
+          </a:fillRef>
+          <a:effectRef idx="0">
+            <a:schemeClr val="accent1"/>
+          </a:effectRef>
+          <a:fontRef idx="minor">
+            <a:schemeClr val="lt1"/>
+          </a:fontRef>
+        </p:style>
+        <p:txBody>
+          <a:bodyPr rtlCol="0" anchor="t"/>
+          <a:lstStyle/>
+          <a:p>
+            <a:r>
+              <a:rPr lang="en-GB" sz="1400" dirty="0">
+                <a:solidFill>
+                  <a:srgbClr val="2E5287"/>
+                </a:solidFill>
+                <a:ea typeface="Noto Sans" panose="020B0502040504020204" pitchFamily="34" charset="0"/>
+                <a:cs typeface="Noto Sans" panose="020B0502040504020204" pitchFamily="34" charset="0"/>
+              </a:rPr>
+              <a:t>Immune System </a:t>
+            </a:r>
+          </a:p>
+          <a:p>
+            <a:r>
+              <a:rPr lang="en-GB" sz="1400" dirty="0">
+                <a:solidFill>
+                  <a:srgbClr val="2E5287"/>
+                </a:solidFill>
+                <a:ea typeface="Noto Sans" panose="020B0502040504020204" pitchFamily="34" charset="0"/>
+                <a:cs typeface="Noto Sans" panose="020B0502040504020204" pitchFamily="34" charset="0"/>
+              </a:rPr>
+              <a:t>Develop. </a:t>
+            </a:r>
+            <a:r>
+              <a:rPr lang="en-GB" sz="1400" dirty="0">
+                <a:solidFill>
+                  <a:srgbClr val="2E5287"/>
+                </a:solidFill>
+                <a:latin typeface="Noto Sans InsParthi" panose="020F0502020204030204" pitchFamily="34" charset="0"/>
+                <a:cs typeface="Noto Sans InsParthi" panose="020F0502020204030204" pitchFamily="34" charset="0"/>
+              </a:rPr>
+              <a:t>★☆☆☆☆</a:t>
             </a:r>
           </a:p>
         </p:txBody>

</xml_diff>